<commit_message>
Trying to add slides
</commit_message>
<xml_diff>
--- a/Project 3 The Impact of Covid 19 (3).pptx
+++ b/Project 3 The Impact of Covid 19 (3).pptx
@@ -5,22 +5,24 @@
     <p:sldMasterId id="2147483648" r:id="rId1"/>
   </p:sldMasterIdLst>
   <p:notesMasterIdLst>
-    <p:notesMasterId r:id="rId15"/>
+    <p:notesMasterId r:id="rId17"/>
   </p:notesMasterIdLst>
   <p:sldIdLst>
     <p:sldId id="256" r:id="rId2"/>
     <p:sldId id="257" r:id="rId3"/>
     <p:sldId id="268" r:id="rId4"/>
-    <p:sldId id="258" r:id="rId5"/>
-    <p:sldId id="259" r:id="rId6"/>
-    <p:sldId id="260" r:id="rId7"/>
-    <p:sldId id="266" r:id="rId8"/>
-    <p:sldId id="267" r:id="rId9"/>
-    <p:sldId id="261" r:id="rId10"/>
-    <p:sldId id="262" r:id="rId11"/>
-    <p:sldId id="263" r:id="rId12"/>
-    <p:sldId id="264" r:id="rId13"/>
-    <p:sldId id="265" r:id="rId14"/>
+    <p:sldId id="269" r:id="rId5"/>
+    <p:sldId id="258" r:id="rId6"/>
+    <p:sldId id="270" r:id="rId7"/>
+    <p:sldId id="259" r:id="rId8"/>
+    <p:sldId id="260" r:id="rId9"/>
+    <p:sldId id="266" r:id="rId10"/>
+    <p:sldId id="267" r:id="rId11"/>
+    <p:sldId id="261" r:id="rId12"/>
+    <p:sldId id="262" r:id="rId13"/>
+    <p:sldId id="263" r:id="rId14"/>
+    <p:sldId id="264" r:id="rId15"/>
+    <p:sldId id="265" r:id="rId16"/>
   </p:sldIdLst>
   <p:sldSz cx="12192000" cy="6858000"/>
   <p:notesSz cx="6858000" cy="9144000"/>
@@ -131,8 +133,30 @@
 <p1510:revInfo xmlns:a="http://schemas.openxmlformats.org/drawingml/2006/main" xmlns:r="http://schemas.openxmlformats.org/officeDocument/2006/relationships" xmlns:p1510="http://schemas.microsoft.com/office/powerpoint/2015/10/main">
   <p1510:revLst>
     <p1510:client id="{056FF2E7-71A6-4B50-9E6C-D1F89F0F96AD}" v="1" dt="2025-02-05T01:07:33.191"/>
+    <p1510:client id="{3D83D77B-DAE1-47F9-BF3C-801C71959272}" v="1" dt="2025-02-05T01:41:49.136"/>
   </p1510:revLst>
 </p1510:revInfo>
+</file>
+
+<file path=ppt/changesInfos/changesInfo1.xml><?xml version="1.0" encoding="utf-8"?>
+<pc:chgInfo xmlns:a="http://schemas.openxmlformats.org/drawingml/2006/main" xmlns:r="http://schemas.openxmlformats.org/officeDocument/2006/relationships" xmlns:ac="http://schemas.microsoft.com/office/drawing/2013/main/command" xmlns:pc="http://schemas.microsoft.com/office/powerpoint/2013/main/command">
+  <pc:docChgLst>
+    <pc:chgData name="Cordette Gillis" userId="53d62ceb03da24bf" providerId="LiveId" clId="{3D83D77B-DAE1-47F9-BF3C-801C71959272}"/>
+    <pc:docChg chg="delSld">
+      <pc:chgData name="Cordette Gillis" userId="53d62ceb03da24bf" providerId="LiveId" clId="{3D83D77B-DAE1-47F9-BF3C-801C71959272}" dt="2025-02-05T01:41:43.819" v="0" actId="47"/>
+      <pc:docMkLst>
+        <pc:docMk/>
+      </pc:docMkLst>
+      <pc:sldChg chg="del">
+        <pc:chgData name="Cordette Gillis" userId="53d62ceb03da24bf" providerId="LiveId" clId="{3D83D77B-DAE1-47F9-BF3C-801C71959272}" dt="2025-02-05T01:41:43.819" v="0" actId="47"/>
+        <pc:sldMkLst>
+          <pc:docMk/>
+          <pc:sldMk cId="4044413340" sldId="258"/>
+        </pc:sldMkLst>
+      </pc:sldChg>
+    </pc:docChg>
+  </pc:docChgLst>
+</pc:chgInfo>
 </file>
 
 <file path=ppt/charts/chart1.xml><?xml version="1.0" encoding="utf-8"?>
@@ -10514,7 +10538,7 @@
           <a:p>
             <a:fld id="{50C91A78-D471-47DF-B1AA-EF7E4202E771}" type="slidenum">
               <a:rPr lang="en-US" smtClean="0"/>
-              <a:t>7</a:t>
+              <a:t>9</a:t>
             </a:fld>
             <a:endParaRPr lang="en-US"/>
           </a:p>
@@ -10775,7 +10799,7 @@
           <a:p>
             <a:fld id="{50C91A78-D471-47DF-B1AA-EF7E4202E771}" type="slidenum">
               <a:rPr lang="en-US" smtClean="0"/>
-              <a:t>8</a:t>
+              <a:t>10</a:t>
             </a:fld>
             <a:endParaRPr lang="en-US"/>
           </a:p>
@@ -16550,85 +16574,70 @@
           <a:chExt cx="0" cy="0"/>
         </a:xfrm>
       </p:grpSpPr>
-      <p:sp>
-        <p:nvSpPr>
-          <p:cNvPr id="2" name="Title 1"/>
-          <p:cNvSpPr>
-            <a:spLocks noGrp="1"/>
-          </p:cNvSpPr>
+      <p:pic>
+        <p:nvPicPr>
+          <p:cNvPr id="11" name="Picture 10">
+            <a:extLst>
+              <a:ext uri="{FF2B5EF4-FFF2-40B4-BE49-F238E27FC236}">
+                <a16:creationId xmlns:a16="http://schemas.microsoft.com/office/drawing/2014/main" id="{58915615-9900-F61E-CE04-AE60F762DD17}"/>
+              </a:ext>
+            </a:extLst>
+          </p:cNvPr>
+          <p:cNvPicPr>
+            <a:picLocks noChangeAspect="1"/>
+          </p:cNvPicPr>
+          <p:nvPr/>
+        </p:nvPicPr>
+        <p:blipFill>
+          <a:blip r:embed="rId3"/>
+          <a:stretch>
+            <a:fillRect/>
+          </a:stretch>
+        </p:blipFill>
+        <p:spPr>
+          <a:xfrm>
+            <a:off x="2686539" y="1013404"/>
+            <a:ext cx="4495541" cy="591110"/>
+          </a:xfrm>
+          <a:prstGeom prst="rect">
+            <a:avLst/>
+          </a:prstGeom>
+        </p:spPr>
+      </p:pic>
+      <p:graphicFrame>
+        <p:nvGraphicFramePr>
+          <p:cNvPr id="15" name="Chart 14">
+            <a:extLst>
+              <a:ext uri="{FF2B5EF4-FFF2-40B4-BE49-F238E27FC236}">
+                <a16:creationId xmlns:a16="http://schemas.microsoft.com/office/drawing/2014/main" id="{4A264DC8-63DB-3414-EC3C-85FD99686673}"/>
+              </a:ext>
+            </a:extLst>
+          </p:cNvPr>
+          <p:cNvGraphicFramePr>
+            <a:graphicFrameLocks/>
+          </p:cNvGraphicFramePr>
           <p:nvPr>
-            <p:ph type="title"/>
+            <p:extLst>
+              <p:ext uri="{D42A27DB-BD31-4B8C-83A1-F6EECF244321}">
+                <p14:modId xmlns:p14="http://schemas.microsoft.com/office/powerpoint/2010/main" val="722630776"/>
+              </p:ext>
+            </p:extLst>
           </p:nvPr>
-        </p:nvSpPr>
-        <p:spPr/>
-        <p:txBody>
-          <a:bodyPr/>
-          <a:lstStyle/>
-          <a:p>
-            <a:r>
-              <a:rPr lang="en-US" dirty="0"/>
-              <a:t>Demographic Insights:</a:t>
-            </a:r>
-          </a:p>
-        </p:txBody>
-      </p:sp>
-      <p:sp>
-        <p:nvSpPr>
-          <p:cNvPr id="3" name="Content Placeholder 2"/>
-          <p:cNvSpPr>
-            <a:spLocks noGrp="1"/>
-          </p:cNvSpPr>
-          <p:nvPr>
-            <p:ph idx="1"/>
-          </p:nvPr>
-        </p:nvSpPr>
-        <p:spPr/>
-        <p:txBody>
-          <a:bodyPr/>
-          <a:lstStyle/>
-          <a:p>
-            <a:r>
-              <a:rPr lang="en-US" dirty="0"/>
-              <a:t>1. Were certain of the various demographic groups have disproportionately been affected by overdose deaths post-COVID such as.</a:t>
-            </a:r>
-          </a:p>
-          <a:p>
-            <a:endParaRPr lang="en-US" dirty="0"/>
-          </a:p>
-          <a:p>
-            <a:endParaRPr lang="en-US" dirty="0"/>
-          </a:p>
-          <a:p>
-            <a:r>
-              <a:rPr lang="en-US" dirty="0"/>
-              <a:t>2.Releating how these changes compare to pre-COVID trends.</a:t>
-            </a:r>
-          </a:p>
-          <a:p>
-            <a:pPr>
-              <a:buFont typeface="Wingdings" panose="05000000000000000000" pitchFamily="2" charset="2"/>
-              <a:buChar char="§"/>
-            </a:pPr>
-            <a:endParaRPr lang="en-US" dirty="0"/>
-          </a:p>
-          <a:p>
-            <a:pPr marL="0" indent="0">
-              <a:buNone/>
-            </a:pPr>
-            <a:endParaRPr lang="en-US" dirty="0"/>
-          </a:p>
-          <a:p>
-            <a:endParaRPr lang="en-US" dirty="0"/>
-          </a:p>
-          <a:p>
-            <a:endParaRPr lang="en-US" dirty="0"/>
-          </a:p>
-        </p:txBody>
-      </p:sp>
+        </p:nvGraphicFramePr>
+        <p:xfrm>
+          <a:off x="276045" y="1604514"/>
+          <a:ext cx="9851366" cy="4240082"/>
+        </p:xfrm>
+        <a:graphic>
+          <a:graphicData uri="http://schemas.openxmlformats.org/drawingml/2006/chart">
+            <c:chart xmlns:c="http://schemas.openxmlformats.org/drawingml/2006/chart" xmlns:r="http://schemas.openxmlformats.org/officeDocument/2006/relationships" r:id="rId4"/>
+          </a:graphicData>
+        </a:graphic>
+      </p:graphicFrame>
     </p:spTree>
     <p:extLst>
       <p:ext uri="{BB962C8B-B14F-4D97-AF65-F5344CB8AC3E}">
-        <p14:creationId xmlns:p14="http://schemas.microsoft.com/office/powerpoint/2010/main" val="1404142582"/>
+        <p14:creationId xmlns:p14="http://schemas.microsoft.com/office/powerpoint/2010/main" val="4090048781"/>
       </p:ext>
     </p:extLst>
   </p:cSld>
@@ -16672,49 +16681,44 @@
           <a:p>
             <a:r>
               <a:rPr lang="en-US" dirty="0"/>
-              <a:t>Substance-Specific Trends:</a:t>
+              <a:t>Overdose by Various Drug Types </a:t>
             </a:r>
           </a:p>
         </p:txBody>
       </p:sp>
-      <p:sp>
-        <p:nvSpPr>
-          <p:cNvPr id="3" name="Content Placeholder 2"/>
-          <p:cNvSpPr>
-            <a:spLocks noGrp="1"/>
-          </p:cNvSpPr>
+      <p:pic>
+        <p:nvPicPr>
+          <p:cNvPr id="4" name="Content Placeholder 3"/>
+          <p:cNvPicPr>
+            <a:picLocks noGrp="1" noChangeAspect="1"/>
+          </p:cNvPicPr>
           <p:nvPr>
             <p:ph idx="1"/>
           </p:nvPr>
-        </p:nvSpPr>
-        <p:spPr/>
-        <p:txBody>
-          <a:bodyPr/>
-          <a:lstStyle/>
-          <a:p>
-            <a:r>
-              <a:rPr lang="en-US" dirty="0"/>
-              <a:t>Here we disclosed the data to showing if the substances involved in overdose deaths shift during the pandemic.</a:t>
-            </a:r>
-          </a:p>
-          <a:p>
-            <a:endParaRPr lang="en-US" dirty="0"/>
-          </a:p>
-          <a:p>
-            <a:endParaRPr lang="en-US" dirty="0"/>
-          </a:p>
-          <a:p>
-            <a:r>
-              <a:rPr lang="en-US" dirty="0"/>
-              <a:t>If so the synthetic drugs, such as fentanyl, play in post –COVID overdose rates.</a:t>
-            </a:r>
-          </a:p>
-        </p:txBody>
-      </p:sp>
+        </p:nvPicPr>
+        <p:blipFill>
+          <a:blip r:embed="rId2">
+            <a:extLst>
+              <a:ext uri="{28A0092B-C50C-407E-A947-70E740481C1C}">
+                <a14:useLocalDpi xmlns:a14="http://schemas.microsoft.com/office/drawing/2010/main" val="0"/>
+              </a:ext>
+            </a:extLst>
+          </a:blip>
+          <a:stretch>
+            <a:fillRect/>
+          </a:stretch>
+        </p:blipFill>
+        <p:spPr>
+          <a:xfrm>
+            <a:off x="677334" y="2160588"/>
+            <a:ext cx="8408609" cy="4472441"/>
+          </a:xfrm>
+        </p:spPr>
+      </p:pic>
     </p:spTree>
     <p:extLst>
       <p:ext uri="{BB962C8B-B14F-4D97-AF65-F5344CB8AC3E}">
-        <p14:creationId xmlns:p14="http://schemas.microsoft.com/office/powerpoint/2010/main" val="3242618254"/>
+        <p14:creationId xmlns:p14="http://schemas.microsoft.com/office/powerpoint/2010/main" val="715273905"/>
       </p:ext>
     </p:extLst>
   </p:cSld>
@@ -16758,7 +16762,7 @@
           <a:p>
             <a:r>
               <a:rPr lang="en-US" dirty="0"/>
-              <a:t>Correlations with Pandemic Factors:</a:t>
+              <a:t>Demographic Insights:</a:t>
             </a:r>
           </a:p>
         </p:txBody>
@@ -16780,6 +16784,197 @@
           <a:p>
             <a:r>
               <a:rPr lang="en-US" dirty="0"/>
+              <a:t>1. Were certain of the various demographic groups have disproportionately been affected by overdose deaths post-COVID such as.</a:t>
+            </a:r>
+          </a:p>
+          <a:p>
+            <a:endParaRPr lang="en-US" dirty="0"/>
+          </a:p>
+          <a:p>
+            <a:endParaRPr lang="en-US" dirty="0"/>
+          </a:p>
+          <a:p>
+            <a:r>
+              <a:rPr lang="en-US" dirty="0"/>
+              <a:t>2.Releating how these changes compare to pre-COVID trends.</a:t>
+            </a:r>
+          </a:p>
+          <a:p>
+            <a:pPr>
+              <a:buFont typeface="Wingdings" panose="05000000000000000000" pitchFamily="2" charset="2"/>
+              <a:buChar char="§"/>
+            </a:pPr>
+            <a:endParaRPr lang="en-US" dirty="0"/>
+          </a:p>
+          <a:p>
+            <a:pPr marL="0" indent="0">
+              <a:buNone/>
+            </a:pPr>
+            <a:endParaRPr lang="en-US" dirty="0"/>
+          </a:p>
+          <a:p>
+            <a:endParaRPr lang="en-US" dirty="0"/>
+          </a:p>
+          <a:p>
+            <a:endParaRPr lang="en-US" dirty="0"/>
+          </a:p>
+        </p:txBody>
+      </p:sp>
+    </p:spTree>
+    <p:extLst>
+      <p:ext uri="{BB962C8B-B14F-4D97-AF65-F5344CB8AC3E}">
+        <p14:creationId xmlns:p14="http://schemas.microsoft.com/office/powerpoint/2010/main" val="1404142582"/>
+      </p:ext>
+    </p:extLst>
+  </p:cSld>
+  <p:clrMapOvr>
+    <a:masterClrMapping/>
+  </p:clrMapOvr>
+</p:sld>
+</file>
+
+<file path=ppt/slides/slide13.xml><?xml version="1.0" encoding="utf-8"?>
+<p:sld xmlns:a="http://schemas.openxmlformats.org/drawingml/2006/main" xmlns:r="http://schemas.openxmlformats.org/officeDocument/2006/relationships" xmlns:p="http://schemas.openxmlformats.org/presentationml/2006/main">
+  <p:cSld>
+    <p:spTree>
+      <p:nvGrpSpPr>
+        <p:cNvPr id="1" name=""/>
+        <p:cNvGrpSpPr/>
+        <p:nvPr/>
+      </p:nvGrpSpPr>
+      <p:grpSpPr>
+        <a:xfrm>
+          <a:off x="0" y="0"/>
+          <a:ext cx="0" cy="0"/>
+          <a:chOff x="0" y="0"/>
+          <a:chExt cx="0" cy="0"/>
+        </a:xfrm>
+      </p:grpSpPr>
+      <p:sp>
+        <p:nvSpPr>
+          <p:cNvPr id="2" name="Title 1"/>
+          <p:cNvSpPr>
+            <a:spLocks noGrp="1"/>
+          </p:cNvSpPr>
+          <p:nvPr>
+            <p:ph type="title"/>
+          </p:nvPr>
+        </p:nvSpPr>
+        <p:spPr/>
+        <p:txBody>
+          <a:bodyPr/>
+          <a:lstStyle/>
+          <a:p>
+            <a:r>
+              <a:rPr lang="en-US" dirty="0"/>
+              <a:t>Substance-Specific Trends:</a:t>
+            </a:r>
+          </a:p>
+        </p:txBody>
+      </p:sp>
+      <p:sp>
+        <p:nvSpPr>
+          <p:cNvPr id="3" name="Content Placeholder 2"/>
+          <p:cNvSpPr>
+            <a:spLocks noGrp="1"/>
+          </p:cNvSpPr>
+          <p:nvPr>
+            <p:ph idx="1"/>
+          </p:nvPr>
+        </p:nvSpPr>
+        <p:spPr/>
+        <p:txBody>
+          <a:bodyPr/>
+          <a:lstStyle/>
+          <a:p>
+            <a:r>
+              <a:rPr lang="en-US" dirty="0"/>
+              <a:t>Here we disclosed the data to showing if the substances involved in overdose deaths shift during the pandemic.</a:t>
+            </a:r>
+          </a:p>
+          <a:p>
+            <a:endParaRPr lang="en-US" dirty="0"/>
+          </a:p>
+          <a:p>
+            <a:endParaRPr lang="en-US" dirty="0"/>
+          </a:p>
+          <a:p>
+            <a:r>
+              <a:rPr lang="en-US" dirty="0"/>
+              <a:t>If so the synthetic drugs, such as fentanyl, play in post –COVID overdose rates.</a:t>
+            </a:r>
+          </a:p>
+        </p:txBody>
+      </p:sp>
+    </p:spTree>
+    <p:extLst>
+      <p:ext uri="{BB962C8B-B14F-4D97-AF65-F5344CB8AC3E}">
+        <p14:creationId xmlns:p14="http://schemas.microsoft.com/office/powerpoint/2010/main" val="3242618254"/>
+      </p:ext>
+    </p:extLst>
+  </p:cSld>
+  <p:clrMapOvr>
+    <a:masterClrMapping/>
+  </p:clrMapOvr>
+</p:sld>
+</file>
+
+<file path=ppt/slides/slide14.xml><?xml version="1.0" encoding="utf-8"?>
+<p:sld xmlns:a="http://schemas.openxmlformats.org/drawingml/2006/main" xmlns:r="http://schemas.openxmlformats.org/officeDocument/2006/relationships" xmlns:p="http://schemas.openxmlformats.org/presentationml/2006/main">
+  <p:cSld>
+    <p:spTree>
+      <p:nvGrpSpPr>
+        <p:cNvPr id="1" name=""/>
+        <p:cNvGrpSpPr/>
+        <p:nvPr/>
+      </p:nvGrpSpPr>
+      <p:grpSpPr>
+        <a:xfrm>
+          <a:off x="0" y="0"/>
+          <a:ext cx="0" cy="0"/>
+          <a:chOff x="0" y="0"/>
+          <a:chExt cx="0" cy="0"/>
+        </a:xfrm>
+      </p:grpSpPr>
+      <p:sp>
+        <p:nvSpPr>
+          <p:cNvPr id="2" name="Title 1"/>
+          <p:cNvSpPr>
+            <a:spLocks noGrp="1"/>
+          </p:cNvSpPr>
+          <p:nvPr>
+            <p:ph type="title"/>
+          </p:nvPr>
+        </p:nvSpPr>
+        <p:spPr/>
+        <p:txBody>
+          <a:bodyPr/>
+          <a:lstStyle/>
+          <a:p>
+            <a:r>
+              <a:rPr lang="en-US" dirty="0"/>
+              <a:t>Correlations with Pandemic Factors:</a:t>
+            </a:r>
+          </a:p>
+        </p:txBody>
+      </p:sp>
+      <p:sp>
+        <p:nvSpPr>
+          <p:cNvPr id="3" name="Content Placeholder 2"/>
+          <p:cNvSpPr>
+            <a:spLocks noGrp="1"/>
+          </p:cNvSpPr>
+          <p:nvPr>
+            <p:ph idx="1"/>
+          </p:nvPr>
+        </p:nvSpPr>
+        <p:spPr/>
+        <p:txBody>
+          <a:bodyPr/>
+          <a:lstStyle/>
+          <a:p>
+            <a:r>
+              <a:rPr lang="en-US" dirty="0"/>
               <a:t>Here we discuss overdose death trends correlated with pandemic – related factors such as-.</a:t>
             </a:r>
           </a:p>
@@ -16825,7 +17020,7 @@
 </p:sld>
 </file>
 
-<file path=ppt/slides/slide13.xml><?xml version="1.0" encoding="utf-8"?>
+<file path=ppt/slides/slide15.xml><?xml version="1.0" encoding="utf-8"?>
 <p:sld xmlns:a="http://schemas.openxmlformats.org/drawingml/2006/main" xmlns:r="http://schemas.openxmlformats.org/officeDocument/2006/relationships" xmlns:p="http://schemas.openxmlformats.org/presentationml/2006/main">
   <p:cSld>
     <p:spTree>
@@ -17247,6 +17442,237 @@
       </p:grpSpPr>
       <p:sp>
         <p:nvSpPr>
+          <p:cNvPr id="2" name="Title 1">
+            <a:extLst>
+              <a:ext uri="{FF2B5EF4-FFF2-40B4-BE49-F238E27FC236}">
+                <a16:creationId xmlns:a16="http://schemas.microsoft.com/office/drawing/2014/main" id="{FCA98A13-1A28-D248-C183-75FAA17AFB66}"/>
+              </a:ext>
+            </a:extLst>
+          </p:cNvPr>
+          <p:cNvSpPr>
+            <a:spLocks noGrp="1"/>
+          </p:cNvSpPr>
+          <p:nvPr>
+            <p:ph type="title"/>
+          </p:nvPr>
+        </p:nvSpPr>
+        <p:spPr>
+          <a:xfrm>
+            <a:off x="677334" y="609600"/>
+            <a:ext cx="8596668" cy="1320800"/>
+          </a:xfrm>
+        </p:spPr>
+        <p:txBody>
+          <a:bodyPr>
+            <a:normAutofit/>
+          </a:bodyPr>
+          <a:lstStyle/>
+          <a:p>
+            <a:r>
+              <a:rPr lang="en-US" sz="3200" dirty="0"/>
+              <a:t>Analyzing Temporal, Geographic, and Substance Related Trends</a:t>
+            </a:r>
+          </a:p>
+        </p:txBody>
+      </p:sp>
+      <p:sp>
+        <p:nvSpPr>
+          <p:cNvPr id="3" name="Content Placeholder 2">
+            <a:extLst>
+              <a:ext uri="{FF2B5EF4-FFF2-40B4-BE49-F238E27FC236}">
+                <a16:creationId xmlns:a16="http://schemas.microsoft.com/office/drawing/2014/main" id="{CE4EE727-7BC3-ED64-D7F2-E1B40913F8C9}"/>
+              </a:ext>
+            </a:extLst>
+          </p:cNvPr>
+          <p:cNvSpPr>
+            <a:spLocks noGrp="1"/>
+          </p:cNvSpPr>
+          <p:nvPr>
+            <p:ph idx="1"/>
+          </p:nvPr>
+        </p:nvSpPr>
+        <p:spPr>
+          <a:xfrm>
+            <a:off x="851994" y="2127321"/>
+            <a:ext cx="8596668" cy="4121079"/>
+          </a:xfrm>
+        </p:spPr>
+        <p:txBody>
+          <a:bodyPr>
+            <a:normAutofit fontScale="25000" lnSpcReduction="20000"/>
+          </a:bodyPr>
+          <a:lstStyle/>
+          <a:p>
+            <a:pPr marL="457200" fontAlgn="base"/>
+            <a:r>
+              <a:rPr lang="en-US" sz="6400" dirty="0">
+                <a:solidFill>
+                  <a:schemeClr val="tx1">
+                    <a:lumMod val="50000"/>
+                    <a:lumOff val="50000"/>
+                  </a:schemeClr>
+                </a:solidFill>
+              </a:rPr>
+              <a:t>Temporal Trends: </a:t>
+            </a:r>
+          </a:p>
+          <a:p>
+            <a:pPr marL="857250" lvl="1" fontAlgn="base"/>
+            <a:r>
+              <a:rPr lang="en-US" sz="6400" dirty="0">
+                <a:solidFill>
+                  <a:schemeClr val="tx1">
+                    <a:lumMod val="50000"/>
+                    <a:lumOff val="50000"/>
+                  </a:schemeClr>
+                </a:solidFill>
+              </a:rPr>
+              <a:t>How did drug overdose death rates change before and after the COVID-19 pandemic?</a:t>
+            </a:r>
+          </a:p>
+          <a:p>
+            <a:pPr marL="857250" lvl="1" fontAlgn="base"/>
+            <a:r>
+              <a:rPr lang="en-US" sz="6400" dirty="0">
+                <a:solidFill>
+                  <a:schemeClr val="tx1">
+                    <a:lumMod val="50000"/>
+                    <a:lumOff val="50000"/>
+                  </a:schemeClr>
+                </a:solidFill>
+              </a:rPr>
+              <a:t>Were there specific time periods during (or immediately following) the pandemic where overdose deaths peaked?</a:t>
+            </a:r>
+          </a:p>
+          <a:p>
+            <a:pPr marL="400050" indent="-285750" fontAlgn="base"/>
+            <a:r>
+              <a:rPr lang="en-US" sz="6400" dirty="0">
+                <a:solidFill>
+                  <a:schemeClr val="tx1">
+                    <a:lumMod val="50000"/>
+                    <a:lumOff val="50000"/>
+                  </a:schemeClr>
+                </a:solidFill>
+              </a:rPr>
+              <a:t>Geographic Analysis: </a:t>
+            </a:r>
+          </a:p>
+          <a:p>
+            <a:pPr marL="800100" lvl="1" fontAlgn="base"/>
+            <a:r>
+              <a:rPr lang="en-US" sz="6400" dirty="0">
+                <a:solidFill>
+                  <a:schemeClr val="tx1">
+                    <a:lumMod val="50000"/>
+                    <a:lumOff val="50000"/>
+                  </a:schemeClr>
+                </a:solidFill>
+              </a:rPr>
+              <a:t>Which states or regions experienced the highest increases in overdose deaths post-COVID?</a:t>
+            </a:r>
+          </a:p>
+          <a:p>
+            <a:pPr marL="800100" lvl="1" fontAlgn="base"/>
+            <a:r>
+              <a:rPr lang="en-US" sz="6400" dirty="0">
+                <a:solidFill>
+                  <a:schemeClr val="tx1">
+                    <a:lumMod val="50000"/>
+                    <a:lumOff val="50000"/>
+                  </a:schemeClr>
+                </a:solidFill>
+              </a:rPr>
+              <a:t>Are there any geographic patterns associated with changes in overdose rates?</a:t>
+            </a:r>
+          </a:p>
+          <a:p>
+            <a:pPr indent="-285750" fontAlgn="base"/>
+            <a:r>
+              <a:rPr lang="en-US" sz="6400" dirty="0">
+                <a:solidFill>
+                  <a:schemeClr val="tx1">
+                    <a:lumMod val="50000"/>
+                    <a:lumOff val="50000"/>
+                  </a:schemeClr>
+                </a:solidFill>
+              </a:rPr>
+              <a:t> Substance Analysis:	</a:t>
+            </a:r>
+          </a:p>
+          <a:p>
+            <a:pPr marL="800100" lvl="1" fontAlgn="base"/>
+            <a:r>
+              <a:rPr lang="en-US" sz="6400" dirty="0">
+                <a:solidFill>
+                  <a:schemeClr val="tx1">
+                    <a:lumMod val="50000"/>
+                    <a:lumOff val="50000"/>
+                  </a:schemeClr>
+                </a:solidFill>
+              </a:rPr>
+              <a:t>Did the types of substances involved in overdose deaths shift during the pandemic?</a:t>
+            </a:r>
+          </a:p>
+          <a:p>
+            <a:pPr marL="800100" lvl="1" fontAlgn="base"/>
+            <a:r>
+              <a:rPr lang="en-US" sz="6400" dirty="0">
+                <a:solidFill>
+                  <a:schemeClr val="tx1">
+                    <a:lumMod val="50000"/>
+                    <a:lumOff val="50000"/>
+                  </a:schemeClr>
+                </a:solidFill>
+              </a:rPr>
+              <a:t>What role did synthetic drugs, such as fentanyl, play in post-COVID overdose rates?</a:t>
+            </a:r>
+          </a:p>
+          <a:p>
+            <a:pPr lvl="1" fontAlgn="base"/>
+            <a:endParaRPr lang="en-US" dirty="0">
+              <a:solidFill>
+                <a:schemeClr val="tx1">
+                  <a:lumMod val="50000"/>
+                  <a:lumOff val="50000"/>
+                </a:schemeClr>
+              </a:solidFill>
+            </a:endParaRPr>
+          </a:p>
+        </p:txBody>
+      </p:sp>
+    </p:spTree>
+    <p:extLst>
+      <p:ext uri="{BB962C8B-B14F-4D97-AF65-F5344CB8AC3E}">
+        <p14:creationId xmlns:p14="http://schemas.microsoft.com/office/powerpoint/2010/main" val="3281237294"/>
+      </p:ext>
+    </p:extLst>
+  </p:cSld>
+  <p:clrMapOvr>
+    <a:masterClrMapping/>
+  </p:clrMapOvr>
+</p:sld>
+</file>
+
+<file path=ppt/slides/slide5.xml><?xml version="1.0" encoding="utf-8"?>
+<p:sld xmlns:a="http://schemas.openxmlformats.org/drawingml/2006/main" xmlns:r="http://schemas.openxmlformats.org/officeDocument/2006/relationships" xmlns:p="http://schemas.openxmlformats.org/presentationml/2006/main">
+  <p:cSld>
+    <p:spTree>
+      <p:nvGrpSpPr>
+        <p:cNvPr id="1" name=""/>
+        <p:cNvGrpSpPr/>
+        <p:nvPr/>
+      </p:nvGrpSpPr>
+      <p:grpSpPr>
+        <a:xfrm>
+          <a:off x="0" y="0"/>
+          <a:ext cx="0" cy="0"/>
+          <a:chOff x="0" y="0"/>
+          <a:chExt cx="0" cy="0"/>
+        </a:xfrm>
+      </p:grpSpPr>
+      <p:sp>
+        <p:nvSpPr>
           <p:cNvPr id="2" name="Title 1"/>
           <p:cNvSpPr>
             <a:spLocks noGrp="1"/>
@@ -17255,45 +17681,146 @@
             <p:ph type="title"/>
           </p:nvPr>
         </p:nvSpPr>
-        <p:spPr/>
+        <p:spPr>
+          <a:xfrm>
+            <a:off x="287003" y="578777"/>
+            <a:ext cx="9411888" cy="1320800"/>
+          </a:xfrm>
+        </p:spPr>
         <p:txBody>
           <a:bodyPr/>
           <a:lstStyle/>
           <a:p>
             <a:r>
               <a:rPr lang="en-US" dirty="0"/>
-              <a:t>CDC Results of overdose by year.</a:t>
+              <a:t>Visual 1: Geographic and Substance Analysis</a:t>
             </a:r>
           </a:p>
         </p:txBody>
       </p:sp>
       <p:pic>
         <p:nvPicPr>
-          <p:cNvPr id="5" name="Content Placeholder 4"/>
+          <p:cNvPr id="7" name="Picture 6">
+            <a:extLst>
+              <a:ext uri="{FF2B5EF4-FFF2-40B4-BE49-F238E27FC236}">
+                <a16:creationId xmlns:a16="http://schemas.microsoft.com/office/drawing/2014/main" id="{B94C39B6-8F34-FE4B-ED16-3D9F860D294A}"/>
+              </a:ext>
+            </a:extLst>
+          </p:cNvPr>
           <p:cNvPicPr>
-            <a:picLocks noGrp="1" noChangeAspect="1"/>
+            <a:picLocks noChangeAspect="1"/>
           </p:cNvPicPr>
-          <p:nvPr>
-            <p:ph idx="1"/>
-          </p:nvPr>
+          <p:nvPr/>
         </p:nvPicPr>
         <p:blipFill>
-          <a:blip r:embed="rId2">
-            <a:extLst>
-              <a:ext uri="{28A0092B-C50C-407E-A947-70E740481C1C}">
-                <a14:useLocalDpi xmlns:a14="http://schemas.microsoft.com/office/drawing/2010/main" val="0"/>
-              </a:ext>
-            </a:extLst>
-          </a:blip>
+          <a:blip r:embed="rId2"/>
           <a:stretch>
             <a:fillRect/>
           </a:stretch>
         </p:blipFill>
         <p:spPr>
           <a:xfrm>
-            <a:off x="498764" y="1392382"/>
-            <a:ext cx="8562109" cy="5465618"/>
+            <a:off x="574680" y="1526284"/>
+            <a:ext cx="8549086" cy="4093111"/>
           </a:xfrm>
+          <a:prstGeom prst="rect">
+            <a:avLst/>
+          </a:prstGeom>
+        </p:spPr>
+      </p:pic>
+      <p:sp>
+        <p:nvSpPr>
+          <p:cNvPr id="8" name="TextBox 7">
+            <a:extLst>
+              <a:ext uri="{FF2B5EF4-FFF2-40B4-BE49-F238E27FC236}">
+                <a16:creationId xmlns:a16="http://schemas.microsoft.com/office/drawing/2014/main" id="{D03EF7E2-1C6A-6BF8-CEAB-6523FF774BB3}"/>
+              </a:ext>
+            </a:extLst>
+          </p:cNvPr>
+          <p:cNvSpPr txBox="1"/>
+          <p:nvPr/>
+        </p:nvSpPr>
+        <p:spPr>
+          <a:xfrm>
+            <a:off x="4099389" y="6436097"/>
+            <a:ext cx="3780890" cy="261610"/>
+          </a:xfrm>
+          <a:prstGeom prst="rect">
+            <a:avLst/>
+          </a:prstGeom>
+          <a:noFill/>
+        </p:spPr>
+        <p:txBody>
+          <a:bodyPr wrap="square" rtlCol="0">
+            <a:spAutoFit/>
+          </a:bodyPr>
+          <a:lstStyle/>
+          <a:p>
+            <a:pPr marL="0" marR="0" lvl="0" indent="0" algn="l" defTabSz="457200" rtl="0" eaLnBrk="1" fontAlgn="auto" latinLnBrk="0" hangingPunct="1">
+              <a:lnSpc>
+                <a:spcPct val="100000"/>
+              </a:lnSpc>
+              <a:spcBef>
+                <a:spcPts val="0"/>
+              </a:spcBef>
+              <a:spcAft>
+                <a:spcPts val="0"/>
+              </a:spcAft>
+              <a:buClrTx/>
+              <a:buSzTx/>
+              <a:buFontTx/>
+              <a:buNone/>
+              <a:tabLst/>
+              <a:defRPr/>
+            </a:pPr>
+            <a:r>
+              <a:rPr kumimoji="0" lang="en-US" sz="1100" b="0" i="0" u="none" strike="noStrike" kern="1200" cap="none" spc="0" normalizeH="0" baseline="0" noProof="0" dirty="0">
+                <a:ln>
+                  <a:noFill/>
+                </a:ln>
+                <a:solidFill>
+                  <a:prstClr val="black"/>
+                </a:solidFill>
+                <a:effectLst/>
+                <a:uLnTx/>
+                <a:uFillTx/>
+                <a:latin typeface="Trebuchet MS" panose="020B0603020202020204"/>
+                <a:ea typeface="+mn-ea"/>
+                <a:cs typeface="+mn-cs"/>
+              </a:rPr>
+              <a:t>* Only substance not visible in drop down box is Xylazine</a:t>
+            </a:r>
+          </a:p>
+        </p:txBody>
+      </p:sp>
+      <p:pic>
+        <p:nvPicPr>
+          <p:cNvPr id="12" name="Picture 11">
+            <a:extLst>
+              <a:ext uri="{FF2B5EF4-FFF2-40B4-BE49-F238E27FC236}">
+                <a16:creationId xmlns:a16="http://schemas.microsoft.com/office/drawing/2014/main" id="{603E1753-6350-53D5-6AFC-DDD6E8AABF05}"/>
+              </a:ext>
+            </a:extLst>
+          </p:cNvPr>
+          <p:cNvPicPr>
+            <a:picLocks noChangeAspect="1"/>
+          </p:cNvPicPr>
+          <p:nvPr/>
+        </p:nvPicPr>
+        <p:blipFill>
+          <a:blip r:embed="rId3"/>
+          <a:stretch>
+            <a:fillRect/>
+          </a:stretch>
+        </p:blipFill>
+        <p:spPr>
+          <a:xfrm>
+            <a:off x="7683888" y="4666646"/>
+            <a:ext cx="4408796" cy="1612577"/>
+          </a:xfrm>
+          <a:prstGeom prst="rect">
+            <a:avLst/>
+          </a:prstGeom>
         </p:spPr>
       </p:pic>
     </p:spTree>
@@ -17309,7 +17836,233 @@
 </p:sld>
 </file>
 
-<file path=ppt/slides/slide5.xml><?xml version="1.0" encoding="utf-8"?>
+<file path=ppt/slides/slide6.xml><?xml version="1.0" encoding="utf-8"?>
+<p:sld xmlns:a="http://schemas.openxmlformats.org/drawingml/2006/main" xmlns:r="http://schemas.openxmlformats.org/officeDocument/2006/relationships" xmlns:p="http://schemas.openxmlformats.org/presentationml/2006/main">
+  <p:cSld>
+    <p:spTree>
+      <p:nvGrpSpPr>
+        <p:cNvPr id="1" name="">
+          <a:extLst>
+            <a:ext uri="{FF2B5EF4-FFF2-40B4-BE49-F238E27FC236}">
+              <a16:creationId xmlns:a16="http://schemas.microsoft.com/office/drawing/2014/main" id="{0A756CB8-5720-E27F-EDCD-E1B46553BF65}"/>
+            </a:ext>
+          </a:extLst>
+        </p:cNvPr>
+        <p:cNvGrpSpPr/>
+        <p:nvPr/>
+      </p:nvGrpSpPr>
+      <p:grpSpPr>
+        <a:xfrm>
+          <a:off x="0" y="0"/>
+          <a:ext cx="0" cy="0"/>
+          <a:chOff x="0" y="0"/>
+          <a:chExt cx="0" cy="0"/>
+        </a:xfrm>
+      </p:grpSpPr>
+      <p:sp>
+        <p:nvSpPr>
+          <p:cNvPr id="2" name="Title 1">
+            <a:extLst>
+              <a:ext uri="{FF2B5EF4-FFF2-40B4-BE49-F238E27FC236}">
+                <a16:creationId xmlns:a16="http://schemas.microsoft.com/office/drawing/2014/main" id="{ADBD32B9-295F-0E11-B98E-F05A54FB2338}"/>
+              </a:ext>
+            </a:extLst>
+          </p:cNvPr>
+          <p:cNvSpPr>
+            <a:spLocks noGrp="1"/>
+          </p:cNvSpPr>
+          <p:nvPr>
+            <p:ph type="title"/>
+          </p:nvPr>
+        </p:nvSpPr>
+        <p:spPr>
+          <a:xfrm>
+            <a:off x="315957" y="599326"/>
+            <a:ext cx="9319421" cy="1320800"/>
+          </a:xfrm>
+        </p:spPr>
+        <p:txBody>
+          <a:bodyPr/>
+          <a:lstStyle/>
+          <a:p>
+            <a:r>
+              <a:rPr lang="en-US" dirty="0"/>
+              <a:t>Substance Analysis</a:t>
+            </a:r>
+          </a:p>
+        </p:txBody>
+      </p:sp>
+      <p:sp>
+        <p:nvSpPr>
+          <p:cNvPr id="3" name="Content Placeholder 2">
+            <a:extLst>
+              <a:ext uri="{FF2B5EF4-FFF2-40B4-BE49-F238E27FC236}">
+                <a16:creationId xmlns:a16="http://schemas.microsoft.com/office/drawing/2014/main" id="{03AF8378-5E12-6578-0D80-5B9ED1FEBC42}"/>
+              </a:ext>
+            </a:extLst>
+          </p:cNvPr>
+          <p:cNvSpPr>
+            <a:spLocks noGrp="1"/>
+          </p:cNvSpPr>
+          <p:nvPr>
+            <p:ph idx="1"/>
+          </p:nvPr>
+        </p:nvSpPr>
+        <p:spPr>
+          <a:xfrm>
+            <a:off x="677333" y="1488613"/>
+            <a:ext cx="8596668" cy="3880773"/>
+          </a:xfrm>
+        </p:spPr>
+        <p:txBody>
+          <a:bodyPr>
+            <a:normAutofit/>
+          </a:bodyPr>
+          <a:lstStyle/>
+          <a:p>
+            <a:pPr indent="-285750" fontAlgn="base"/>
+            <a:r>
+              <a:rPr lang="en-US" sz="1600" dirty="0">
+                <a:solidFill>
+                  <a:schemeClr val="tx1">
+                    <a:lumMod val="50000"/>
+                    <a:lumOff val="50000"/>
+                  </a:schemeClr>
+                </a:solidFill>
+              </a:rPr>
+              <a:t>Substance Analysis:	</a:t>
+            </a:r>
+          </a:p>
+          <a:p>
+            <a:pPr marL="800100" lvl="1" fontAlgn="base"/>
+            <a:r>
+              <a:rPr lang="en-US" dirty="0">
+                <a:solidFill>
+                  <a:schemeClr val="tx1">
+                    <a:lumMod val="50000"/>
+                    <a:lumOff val="50000"/>
+                  </a:schemeClr>
+                </a:solidFill>
+              </a:rPr>
+              <a:t>Did the types of substances involved in overdose deaths shift during the pandemic?</a:t>
+            </a:r>
+          </a:p>
+          <a:p>
+            <a:pPr marL="1200150" lvl="2" fontAlgn="base"/>
+            <a:r>
+              <a:rPr lang="en-US" dirty="0">
+                <a:solidFill>
+                  <a:schemeClr val="tx1">
+                    <a:lumMod val="50000"/>
+                    <a:lumOff val="50000"/>
+                  </a:schemeClr>
+                </a:solidFill>
+              </a:rPr>
+              <a:t>Yes, cocaine related deaths grew steadily for 6 of the 10 CDC Regions through 2023, then dropped suddenly in 2024, while heroine use actually decreased from 2019-2024</a:t>
+            </a:r>
+          </a:p>
+          <a:p>
+            <a:pPr marL="1200150" lvl="2" fontAlgn="base"/>
+            <a:r>
+              <a:rPr lang="en-US" dirty="0">
+                <a:solidFill>
+                  <a:schemeClr val="tx1">
+                    <a:lumMod val="50000"/>
+                    <a:lumOff val="50000"/>
+                  </a:schemeClr>
+                </a:solidFill>
+              </a:rPr>
+              <a:t>All 4 of the 7 major substances listed saw consistent increases in death rates through 2023, the other 3 either decreased (Heroin) or only saw a brief increase in mortality rates (Gabapentin and Oxycodone)</a:t>
+            </a:r>
+          </a:p>
+          <a:p>
+            <a:pPr marL="800100" lvl="1" fontAlgn="base"/>
+            <a:r>
+              <a:rPr lang="en-US" dirty="0">
+                <a:solidFill>
+                  <a:schemeClr val="tx1">
+                    <a:lumMod val="50000"/>
+                    <a:lumOff val="50000"/>
+                  </a:schemeClr>
+                </a:solidFill>
+              </a:rPr>
+              <a:t>What role did synthetic drugs, such as fentanyl, play in post-COVID overdose rates?</a:t>
+            </a:r>
+          </a:p>
+          <a:p>
+            <a:pPr marL="1200150" lvl="2" fontAlgn="base"/>
+            <a:r>
+              <a:rPr lang="en-US" dirty="0">
+                <a:solidFill>
+                  <a:schemeClr val="tx1">
+                    <a:lumMod val="50000"/>
+                    <a:lumOff val="50000"/>
+                  </a:schemeClr>
+                </a:solidFill>
+              </a:rPr>
+              <a:t>Fentanyl, Methamphetamine, </a:t>
+            </a:r>
+            <a:r>
+              <a:rPr lang="en-US" dirty="0" err="1">
+                <a:solidFill>
+                  <a:schemeClr val="tx1">
+                    <a:lumMod val="50000"/>
+                    <a:lumOff val="50000"/>
+                  </a:schemeClr>
+                </a:solidFill>
+              </a:rPr>
+              <a:t>Gapabentin</a:t>
+            </a:r>
+            <a:r>
+              <a:rPr lang="en-US" dirty="0">
+                <a:solidFill>
+                  <a:schemeClr val="tx1">
+                    <a:lumMod val="50000"/>
+                    <a:lumOff val="50000"/>
+                  </a:schemeClr>
+                </a:solidFill>
+              </a:rPr>
+              <a:t>, and Xylazine are the only fully synthetic drugs included in this project. These drugs accounted for 57.5% of all reported drug related deaths in 2019 </a:t>
+            </a:r>
+            <a:r>
+              <a:rPr lang="en-US">
+                <a:solidFill>
+                  <a:schemeClr val="tx1">
+                    <a:lumMod val="50000"/>
+                    <a:lumOff val="50000"/>
+                  </a:schemeClr>
+                </a:solidFill>
+              </a:rPr>
+              <a:t>and increased to 74.7% by 2023.</a:t>
+            </a:r>
+            <a:endParaRPr lang="en-US" dirty="0">
+              <a:solidFill>
+                <a:schemeClr val="tx1">
+                  <a:lumMod val="50000"/>
+                  <a:lumOff val="50000"/>
+                </a:schemeClr>
+              </a:solidFill>
+            </a:endParaRPr>
+          </a:p>
+          <a:p>
+            <a:endParaRPr lang="en-US" dirty="0"/>
+          </a:p>
+        </p:txBody>
+      </p:sp>
+    </p:spTree>
+    <p:extLst>
+      <p:ext uri="{BB962C8B-B14F-4D97-AF65-F5344CB8AC3E}">
+        <p14:creationId xmlns:p14="http://schemas.microsoft.com/office/powerpoint/2010/main" val="1489391091"/>
+      </p:ext>
+    </p:extLst>
+  </p:cSld>
+  <p:clrMapOvr>
+    <a:masterClrMapping/>
+  </p:clrMapOvr>
+</p:sld>
+</file>
+
+<file path=ppt/slides/slide7.xml><?xml version="1.0" encoding="utf-8"?>
 <p:sld xmlns:a="http://schemas.openxmlformats.org/drawingml/2006/main" xmlns:r="http://schemas.openxmlformats.org/officeDocument/2006/relationships" xmlns:p="http://schemas.openxmlformats.org/presentationml/2006/main">
   <p:cSld>
     <p:spTree>
@@ -17414,7 +18167,7 @@
 </p:sld>
 </file>
 
-<file path=ppt/slides/slide6.xml><?xml version="1.0" encoding="utf-8"?>
+<file path=ppt/slides/slide8.xml><?xml version="1.0" encoding="utf-8"?>
 <p:sld xmlns:a="http://schemas.openxmlformats.org/drawingml/2006/main" xmlns:r="http://schemas.openxmlformats.org/officeDocument/2006/relationships" xmlns:p="http://schemas.openxmlformats.org/presentationml/2006/main">
   <p:cSld>
     <p:spTree>
@@ -17510,7 +18263,7 @@
 </p:sld>
 </file>
 
-<file path=ppt/slides/slide7.xml><?xml version="1.0" encoding="utf-8"?>
+<file path=ppt/slides/slide9.xml><?xml version="1.0" encoding="utf-8"?>
 <p:sld xmlns:a="http://schemas.openxmlformats.org/drawingml/2006/main" xmlns:r="http://schemas.openxmlformats.org/officeDocument/2006/relationships" xmlns:p="http://schemas.openxmlformats.org/presentationml/2006/main">
   <p:cSld>
     <p:spTree>
@@ -17623,177 +18376,6 @@
     <p:extLst>
       <p:ext uri="{BB962C8B-B14F-4D97-AF65-F5344CB8AC3E}">
         <p14:creationId xmlns:p14="http://schemas.microsoft.com/office/powerpoint/2010/main" val="969447734"/>
-      </p:ext>
-    </p:extLst>
-  </p:cSld>
-  <p:clrMapOvr>
-    <a:masterClrMapping/>
-  </p:clrMapOvr>
-</p:sld>
-</file>
-
-<file path=ppt/slides/slide8.xml><?xml version="1.0" encoding="utf-8"?>
-<p:sld xmlns:a="http://schemas.openxmlformats.org/drawingml/2006/main" xmlns:r="http://schemas.openxmlformats.org/officeDocument/2006/relationships" xmlns:p="http://schemas.openxmlformats.org/presentationml/2006/main">
-  <p:cSld>
-    <p:spTree>
-      <p:nvGrpSpPr>
-        <p:cNvPr id="1" name=""/>
-        <p:cNvGrpSpPr/>
-        <p:nvPr/>
-      </p:nvGrpSpPr>
-      <p:grpSpPr>
-        <a:xfrm>
-          <a:off x="0" y="0"/>
-          <a:ext cx="0" cy="0"/>
-          <a:chOff x="0" y="0"/>
-          <a:chExt cx="0" cy="0"/>
-        </a:xfrm>
-      </p:grpSpPr>
-      <p:pic>
-        <p:nvPicPr>
-          <p:cNvPr id="11" name="Picture 10">
-            <a:extLst>
-              <a:ext uri="{FF2B5EF4-FFF2-40B4-BE49-F238E27FC236}">
-                <a16:creationId xmlns:a16="http://schemas.microsoft.com/office/drawing/2014/main" id="{58915615-9900-F61E-CE04-AE60F762DD17}"/>
-              </a:ext>
-            </a:extLst>
-          </p:cNvPr>
-          <p:cNvPicPr>
-            <a:picLocks noChangeAspect="1"/>
-          </p:cNvPicPr>
-          <p:nvPr/>
-        </p:nvPicPr>
-        <p:blipFill>
-          <a:blip r:embed="rId3"/>
-          <a:stretch>
-            <a:fillRect/>
-          </a:stretch>
-        </p:blipFill>
-        <p:spPr>
-          <a:xfrm>
-            <a:off x="2686539" y="1013404"/>
-            <a:ext cx="4495541" cy="591110"/>
-          </a:xfrm>
-          <a:prstGeom prst="rect">
-            <a:avLst/>
-          </a:prstGeom>
-        </p:spPr>
-      </p:pic>
-      <p:graphicFrame>
-        <p:nvGraphicFramePr>
-          <p:cNvPr id="15" name="Chart 14">
-            <a:extLst>
-              <a:ext uri="{FF2B5EF4-FFF2-40B4-BE49-F238E27FC236}">
-                <a16:creationId xmlns:a16="http://schemas.microsoft.com/office/drawing/2014/main" id="{4A264DC8-63DB-3414-EC3C-85FD99686673}"/>
-              </a:ext>
-            </a:extLst>
-          </p:cNvPr>
-          <p:cNvGraphicFramePr>
-            <a:graphicFrameLocks/>
-          </p:cNvGraphicFramePr>
-          <p:nvPr>
-            <p:extLst>
-              <p:ext uri="{D42A27DB-BD31-4B8C-83A1-F6EECF244321}">
-                <p14:modId xmlns:p14="http://schemas.microsoft.com/office/powerpoint/2010/main" val="722630776"/>
-              </p:ext>
-            </p:extLst>
-          </p:nvPr>
-        </p:nvGraphicFramePr>
-        <p:xfrm>
-          <a:off x="276045" y="1604514"/>
-          <a:ext cx="9851366" cy="4240082"/>
-        </p:xfrm>
-        <a:graphic>
-          <a:graphicData uri="http://schemas.openxmlformats.org/drawingml/2006/chart">
-            <c:chart xmlns:c="http://schemas.openxmlformats.org/drawingml/2006/chart" xmlns:r="http://schemas.openxmlformats.org/officeDocument/2006/relationships" r:id="rId4"/>
-          </a:graphicData>
-        </a:graphic>
-      </p:graphicFrame>
-    </p:spTree>
-    <p:extLst>
-      <p:ext uri="{BB962C8B-B14F-4D97-AF65-F5344CB8AC3E}">
-        <p14:creationId xmlns:p14="http://schemas.microsoft.com/office/powerpoint/2010/main" val="4090048781"/>
-      </p:ext>
-    </p:extLst>
-  </p:cSld>
-  <p:clrMapOvr>
-    <a:masterClrMapping/>
-  </p:clrMapOvr>
-</p:sld>
-</file>
-
-<file path=ppt/slides/slide9.xml><?xml version="1.0" encoding="utf-8"?>
-<p:sld xmlns:a="http://schemas.openxmlformats.org/drawingml/2006/main" xmlns:r="http://schemas.openxmlformats.org/officeDocument/2006/relationships" xmlns:p="http://schemas.openxmlformats.org/presentationml/2006/main">
-  <p:cSld>
-    <p:spTree>
-      <p:nvGrpSpPr>
-        <p:cNvPr id="1" name=""/>
-        <p:cNvGrpSpPr/>
-        <p:nvPr/>
-      </p:nvGrpSpPr>
-      <p:grpSpPr>
-        <a:xfrm>
-          <a:off x="0" y="0"/>
-          <a:ext cx="0" cy="0"/>
-          <a:chOff x="0" y="0"/>
-          <a:chExt cx="0" cy="0"/>
-        </a:xfrm>
-      </p:grpSpPr>
-      <p:sp>
-        <p:nvSpPr>
-          <p:cNvPr id="2" name="Title 1"/>
-          <p:cNvSpPr>
-            <a:spLocks noGrp="1"/>
-          </p:cNvSpPr>
-          <p:nvPr>
-            <p:ph type="title"/>
-          </p:nvPr>
-        </p:nvSpPr>
-        <p:spPr/>
-        <p:txBody>
-          <a:bodyPr/>
-          <a:lstStyle/>
-          <a:p>
-            <a:r>
-              <a:rPr lang="en-US" dirty="0"/>
-              <a:t>Overdose by Various Drug Types </a:t>
-            </a:r>
-          </a:p>
-        </p:txBody>
-      </p:sp>
-      <p:pic>
-        <p:nvPicPr>
-          <p:cNvPr id="4" name="Content Placeholder 3"/>
-          <p:cNvPicPr>
-            <a:picLocks noGrp="1" noChangeAspect="1"/>
-          </p:cNvPicPr>
-          <p:nvPr>
-            <p:ph idx="1"/>
-          </p:nvPr>
-        </p:nvPicPr>
-        <p:blipFill>
-          <a:blip r:embed="rId2">
-            <a:extLst>
-              <a:ext uri="{28A0092B-C50C-407E-A947-70E740481C1C}">
-                <a14:useLocalDpi xmlns:a14="http://schemas.microsoft.com/office/drawing/2010/main" val="0"/>
-              </a:ext>
-            </a:extLst>
-          </a:blip>
-          <a:stretch>
-            <a:fillRect/>
-          </a:stretch>
-        </p:blipFill>
-        <p:spPr>
-          <a:xfrm>
-            <a:off x="677334" y="2160588"/>
-            <a:ext cx="8408609" cy="4472441"/>
-          </a:xfrm>
-        </p:spPr>
-      </p:pic>
-    </p:spTree>
-    <p:extLst>
-      <p:ext uri="{BB962C8B-B14F-4D97-AF65-F5344CB8AC3E}">
-        <p14:creationId xmlns:p14="http://schemas.microsoft.com/office/powerpoint/2010/main" val="715273905"/>
       </p:ext>
     </p:extLst>
   </p:cSld>

</xml_diff>